<commit_message>
add input box option
</commit_message>
<xml_diff>
--- a/UI/test.pptx
+++ b/UI/test.pptx
@@ -1,14 +1,21 @@
 
 <file path=ppt/presentation.xml><?xml version="1.0" encoding="utf-8"?>
-<p:presentation xmlns:a="http://schemas.openxmlformats.org/drawingml/2006/main" xmlns:r="http://schemas.openxmlformats.org/officeDocument/2006/relationships" xmlns:p="http://schemas.openxmlformats.org/presentationml/2006/main" saveSubsetFonts="1">
+<p:presentation xmlns:a="http://schemas.openxmlformats.org/drawingml/2006/main" xmlns:r="http://schemas.openxmlformats.org/officeDocument/2006/relationships" xmlns:p="http://schemas.openxmlformats.org/presentationml/2006/main">
   <p:sldMasterIdLst>
     <p:sldMasterId id="2147483648" r:id="rId1"/>
   </p:sldMasterIdLst>
   <p:sldIdLst>
-    <p:sldId id="257" r:id="rId2"/>
+    <p:sldId id="258" r:id="rId2"/>
+    <p:sldId id="257" r:id="rId3"/>
+    <p:sldId id="259" r:id="rId4"/>
+    <p:sldId id="260" r:id="rId5"/>
+    <p:sldId id="261" r:id="rId6"/>
   </p:sldIdLst>
   <p:sldSz cx="12192000" cy="6858000"/>
   <p:notesSz cx="6858000" cy="9144000"/>
+  <p:custDataLst>
+    <p:tags r:id="rId7"/>
+  </p:custDataLst>
   <p:defaultTextStyle>
     <a:defPPr>
       <a:defRPr lang="zh-CN"/>
@@ -104,6 +111,11 @@
       </a:defRPr>
     </a:lvl9pPr>
   </p:defaultTextStyle>
+  <p:extLst>
+    <p:ext uri="{EFAFB233-063F-42B5-8137-9DF3F51BA10A}">
+      <p15:sldGuideLst xmlns:p15="http://schemas.microsoft.com/office/powerpoint/2012/main"/>
+    </p:ext>
+  </p:extLst>
 </p:presentation>
 </file>
 
@@ -126,13 +138,7 @@
       </p:grpSpPr>
       <p:sp>
         <p:nvSpPr>
-          <p:cNvPr id="2" name="标题 1">
-            <a:extLst>
-              <a:ext uri="{FF2B5EF4-FFF2-40B4-BE49-F238E27FC236}">
-                <a16:creationId xmlns:a16="http://schemas.microsoft.com/office/drawing/2014/main" id="{BBFC8C43-2462-323A-FDE9-2A7BE6D47802}"/>
-              </a:ext>
-            </a:extLst>
-          </p:cNvPr>
+          <p:cNvPr id="2" name="标题 1"/>
           <p:cNvSpPr>
             <a:spLocks noGrp="1"/>
           </p:cNvSpPr>
@@ -163,13 +169,7 @@
       </p:sp>
       <p:sp>
         <p:nvSpPr>
-          <p:cNvPr id="3" name="副标题 2">
-            <a:extLst>
-              <a:ext uri="{FF2B5EF4-FFF2-40B4-BE49-F238E27FC236}">
-                <a16:creationId xmlns:a16="http://schemas.microsoft.com/office/drawing/2014/main" id="{429B76DE-37D6-1C6C-127B-9819E3F45431}"/>
-              </a:ext>
-            </a:extLst>
-          </p:cNvPr>
+          <p:cNvPr id="3" name="副标题 2"/>
           <p:cNvSpPr>
             <a:spLocks noGrp="1"/>
           </p:cNvSpPr>
@@ -233,13 +233,7 @@
       </p:sp>
       <p:sp>
         <p:nvSpPr>
-          <p:cNvPr id="4" name="日期占位符 3">
-            <a:extLst>
-              <a:ext uri="{FF2B5EF4-FFF2-40B4-BE49-F238E27FC236}">
-                <a16:creationId xmlns:a16="http://schemas.microsoft.com/office/drawing/2014/main" id="{2FA20358-F7AF-1162-8A4F-856589C14AA6}"/>
-              </a:ext>
-            </a:extLst>
-          </p:cNvPr>
+          <p:cNvPr id="4" name="日期占位符 3"/>
           <p:cNvSpPr>
             <a:spLocks noGrp="1"/>
           </p:cNvSpPr>
@@ -254,7 +248,7 @@
           <a:p>
             <a:fld id="{35278302-CADD-4C61-B105-DF68310DB9E4}" type="datetimeFigureOut">
               <a:rPr lang="zh-CN" altLang="en-US" smtClean="0"/>
-              <a:t>2025/1/22</a:t>
+              <a:t>2025/2/4</a:t>
             </a:fld>
             <a:endParaRPr lang="zh-CN" altLang="en-US"/>
           </a:p>
@@ -262,13 +256,7 @@
       </p:sp>
       <p:sp>
         <p:nvSpPr>
-          <p:cNvPr id="5" name="页脚占位符 4">
-            <a:extLst>
-              <a:ext uri="{FF2B5EF4-FFF2-40B4-BE49-F238E27FC236}">
-                <a16:creationId xmlns:a16="http://schemas.microsoft.com/office/drawing/2014/main" id="{442CB19C-9B41-66C0-DC3D-7173F504B80D}"/>
-              </a:ext>
-            </a:extLst>
-          </p:cNvPr>
+          <p:cNvPr id="5" name="页脚占位符 4"/>
           <p:cNvSpPr>
             <a:spLocks noGrp="1"/>
           </p:cNvSpPr>
@@ -287,13 +275,7 @@
       </p:sp>
       <p:sp>
         <p:nvSpPr>
-          <p:cNvPr id="6" name="灯片编号占位符 5">
-            <a:extLst>
-              <a:ext uri="{FF2B5EF4-FFF2-40B4-BE49-F238E27FC236}">
-                <a16:creationId xmlns:a16="http://schemas.microsoft.com/office/drawing/2014/main" id="{13DC0FFF-8A54-15D6-BDF3-F520408A601D}"/>
-              </a:ext>
-            </a:extLst>
-          </p:cNvPr>
+          <p:cNvPr id="6" name="灯片编号占位符 5"/>
           <p:cNvSpPr>
             <a:spLocks noGrp="1"/>
           </p:cNvSpPr>
@@ -315,11 +297,6 @@
         </p:txBody>
       </p:sp>
     </p:spTree>
-    <p:extLst>
-      <p:ext uri="{BB962C8B-B14F-4D97-AF65-F5344CB8AC3E}">
-        <p14:creationId xmlns:p14="http://schemas.microsoft.com/office/powerpoint/2010/main" val="2024887732"/>
-      </p:ext>
-    </p:extLst>
   </p:cSld>
   <p:clrMapOvr>
     <a:masterClrMapping/>
@@ -346,13 +323,7 @@
       </p:grpSpPr>
       <p:sp>
         <p:nvSpPr>
-          <p:cNvPr id="2" name="标题 1">
-            <a:extLst>
-              <a:ext uri="{FF2B5EF4-FFF2-40B4-BE49-F238E27FC236}">
-                <a16:creationId xmlns:a16="http://schemas.microsoft.com/office/drawing/2014/main" id="{418A09CF-2812-3465-BFD7-EF4BB7CAE968}"/>
-              </a:ext>
-            </a:extLst>
-          </p:cNvPr>
+          <p:cNvPr id="2" name="标题 1"/>
           <p:cNvSpPr>
             <a:spLocks noGrp="1"/>
           </p:cNvSpPr>
@@ -374,13 +345,7 @@
       </p:sp>
       <p:sp>
         <p:nvSpPr>
-          <p:cNvPr id="3" name="竖排文字占位符 2">
-            <a:extLst>
-              <a:ext uri="{FF2B5EF4-FFF2-40B4-BE49-F238E27FC236}">
-                <a16:creationId xmlns:a16="http://schemas.microsoft.com/office/drawing/2014/main" id="{B607A146-F041-C929-A687-84675D79FDC5}"/>
-              </a:ext>
-            </a:extLst>
-          </p:cNvPr>
+          <p:cNvPr id="3" name="竖排文字占位符 2"/>
           <p:cNvSpPr>
             <a:spLocks noGrp="1"/>
           </p:cNvSpPr>
@@ -431,13 +396,7 @@
       </p:sp>
       <p:sp>
         <p:nvSpPr>
-          <p:cNvPr id="4" name="日期占位符 3">
-            <a:extLst>
-              <a:ext uri="{FF2B5EF4-FFF2-40B4-BE49-F238E27FC236}">
-                <a16:creationId xmlns:a16="http://schemas.microsoft.com/office/drawing/2014/main" id="{162F081D-EA49-FAB3-FE7C-EA01554A6AF4}"/>
-              </a:ext>
-            </a:extLst>
-          </p:cNvPr>
+          <p:cNvPr id="4" name="日期占位符 3"/>
           <p:cNvSpPr>
             <a:spLocks noGrp="1"/>
           </p:cNvSpPr>
@@ -452,7 +411,7 @@
           <a:p>
             <a:fld id="{35278302-CADD-4C61-B105-DF68310DB9E4}" type="datetimeFigureOut">
               <a:rPr lang="zh-CN" altLang="en-US" smtClean="0"/>
-              <a:t>2025/1/22</a:t>
+              <a:t>2025/2/4</a:t>
             </a:fld>
             <a:endParaRPr lang="zh-CN" altLang="en-US"/>
           </a:p>
@@ -460,13 +419,7 @@
       </p:sp>
       <p:sp>
         <p:nvSpPr>
-          <p:cNvPr id="5" name="页脚占位符 4">
-            <a:extLst>
-              <a:ext uri="{FF2B5EF4-FFF2-40B4-BE49-F238E27FC236}">
-                <a16:creationId xmlns:a16="http://schemas.microsoft.com/office/drawing/2014/main" id="{12D770FF-DA9B-A87A-295A-53F4BF72558E}"/>
-              </a:ext>
-            </a:extLst>
-          </p:cNvPr>
+          <p:cNvPr id="5" name="页脚占位符 4"/>
           <p:cNvSpPr>
             <a:spLocks noGrp="1"/>
           </p:cNvSpPr>
@@ -485,13 +438,7 @@
       </p:sp>
       <p:sp>
         <p:nvSpPr>
-          <p:cNvPr id="6" name="灯片编号占位符 5">
-            <a:extLst>
-              <a:ext uri="{FF2B5EF4-FFF2-40B4-BE49-F238E27FC236}">
-                <a16:creationId xmlns:a16="http://schemas.microsoft.com/office/drawing/2014/main" id="{4126316B-7218-5261-8836-0EC799E722D2}"/>
-              </a:ext>
-            </a:extLst>
-          </p:cNvPr>
+          <p:cNvPr id="6" name="灯片编号占位符 5"/>
           <p:cNvSpPr>
             <a:spLocks noGrp="1"/>
           </p:cNvSpPr>
@@ -513,11 +460,6 @@
         </p:txBody>
       </p:sp>
     </p:spTree>
-    <p:extLst>
-      <p:ext uri="{BB962C8B-B14F-4D97-AF65-F5344CB8AC3E}">
-        <p14:creationId xmlns:p14="http://schemas.microsoft.com/office/powerpoint/2010/main" val="823303210"/>
-      </p:ext>
-    </p:extLst>
   </p:cSld>
   <p:clrMapOvr>
     <a:masterClrMapping/>
@@ -544,13 +486,7 @@
       </p:grpSpPr>
       <p:sp>
         <p:nvSpPr>
-          <p:cNvPr id="2" name="竖排标题 1">
-            <a:extLst>
-              <a:ext uri="{FF2B5EF4-FFF2-40B4-BE49-F238E27FC236}">
-                <a16:creationId xmlns:a16="http://schemas.microsoft.com/office/drawing/2014/main" id="{6B657019-A4B5-60FC-AF90-DDA06345A19C}"/>
-              </a:ext>
-            </a:extLst>
-          </p:cNvPr>
+          <p:cNvPr id="2" name="竖排标题 1"/>
           <p:cNvSpPr>
             <a:spLocks noGrp="1"/>
           </p:cNvSpPr>
@@ -577,13 +513,7 @@
       </p:sp>
       <p:sp>
         <p:nvSpPr>
-          <p:cNvPr id="3" name="竖排文字占位符 2">
-            <a:extLst>
-              <a:ext uri="{FF2B5EF4-FFF2-40B4-BE49-F238E27FC236}">
-                <a16:creationId xmlns:a16="http://schemas.microsoft.com/office/drawing/2014/main" id="{A2DC7F38-FF20-861E-1BD8-BEB8E88E99CC}"/>
-              </a:ext>
-            </a:extLst>
-          </p:cNvPr>
+          <p:cNvPr id="3" name="竖排文字占位符 2"/>
           <p:cNvSpPr>
             <a:spLocks noGrp="1"/>
           </p:cNvSpPr>
@@ -639,13 +569,7 @@
       </p:sp>
       <p:sp>
         <p:nvSpPr>
-          <p:cNvPr id="4" name="日期占位符 3">
-            <a:extLst>
-              <a:ext uri="{FF2B5EF4-FFF2-40B4-BE49-F238E27FC236}">
-                <a16:creationId xmlns:a16="http://schemas.microsoft.com/office/drawing/2014/main" id="{584A5DA7-72CA-45EC-A1BB-730D9888B3C2}"/>
-              </a:ext>
-            </a:extLst>
-          </p:cNvPr>
+          <p:cNvPr id="4" name="日期占位符 3"/>
           <p:cNvSpPr>
             <a:spLocks noGrp="1"/>
           </p:cNvSpPr>
@@ -660,7 +584,7 @@
           <a:p>
             <a:fld id="{35278302-CADD-4C61-B105-DF68310DB9E4}" type="datetimeFigureOut">
               <a:rPr lang="zh-CN" altLang="en-US" smtClean="0"/>
-              <a:t>2025/1/22</a:t>
+              <a:t>2025/2/4</a:t>
             </a:fld>
             <a:endParaRPr lang="zh-CN" altLang="en-US"/>
           </a:p>
@@ -668,13 +592,7 @@
       </p:sp>
       <p:sp>
         <p:nvSpPr>
-          <p:cNvPr id="5" name="页脚占位符 4">
-            <a:extLst>
-              <a:ext uri="{FF2B5EF4-FFF2-40B4-BE49-F238E27FC236}">
-                <a16:creationId xmlns:a16="http://schemas.microsoft.com/office/drawing/2014/main" id="{019A00AB-258C-347B-E974-68F4DE60E8C7}"/>
-              </a:ext>
-            </a:extLst>
-          </p:cNvPr>
+          <p:cNvPr id="5" name="页脚占位符 4"/>
           <p:cNvSpPr>
             <a:spLocks noGrp="1"/>
           </p:cNvSpPr>
@@ -693,13 +611,7 @@
       </p:sp>
       <p:sp>
         <p:nvSpPr>
-          <p:cNvPr id="6" name="灯片编号占位符 5">
-            <a:extLst>
-              <a:ext uri="{FF2B5EF4-FFF2-40B4-BE49-F238E27FC236}">
-                <a16:creationId xmlns:a16="http://schemas.microsoft.com/office/drawing/2014/main" id="{99607EE8-F350-E294-5B47-C9F248D8E9F2}"/>
-              </a:ext>
-            </a:extLst>
-          </p:cNvPr>
+          <p:cNvPr id="6" name="灯片编号占位符 5"/>
           <p:cNvSpPr>
             <a:spLocks noGrp="1"/>
           </p:cNvSpPr>
@@ -721,11 +633,6 @@
         </p:txBody>
       </p:sp>
     </p:spTree>
-    <p:extLst>
-      <p:ext uri="{BB962C8B-B14F-4D97-AF65-F5344CB8AC3E}">
-        <p14:creationId xmlns:p14="http://schemas.microsoft.com/office/powerpoint/2010/main" val="87857825"/>
-      </p:ext>
-    </p:extLst>
   </p:cSld>
   <p:clrMapOvr>
     <a:masterClrMapping/>
@@ -752,13 +659,7 @@
       </p:grpSpPr>
       <p:sp>
         <p:nvSpPr>
-          <p:cNvPr id="2" name="标题 1">
-            <a:extLst>
-              <a:ext uri="{FF2B5EF4-FFF2-40B4-BE49-F238E27FC236}">
-                <a16:creationId xmlns:a16="http://schemas.microsoft.com/office/drawing/2014/main" id="{6217F9DF-0FC5-4116-2CCF-EF973F4C183D}"/>
-              </a:ext>
-            </a:extLst>
-          </p:cNvPr>
+          <p:cNvPr id="2" name="标题 1"/>
           <p:cNvSpPr>
             <a:spLocks noGrp="1"/>
           </p:cNvSpPr>
@@ -780,13 +681,7 @@
       </p:sp>
       <p:sp>
         <p:nvSpPr>
-          <p:cNvPr id="3" name="内容占位符 2">
-            <a:extLst>
-              <a:ext uri="{FF2B5EF4-FFF2-40B4-BE49-F238E27FC236}">
-                <a16:creationId xmlns:a16="http://schemas.microsoft.com/office/drawing/2014/main" id="{FB0160AE-BB68-F28A-1073-8EC2277F437C}"/>
-              </a:ext>
-            </a:extLst>
-          </p:cNvPr>
+          <p:cNvPr id="3" name="内容占位符 2"/>
           <p:cNvSpPr>
             <a:spLocks noGrp="1"/>
           </p:cNvSpPr>
@@ -837,13 +732,7 @@
       </p:sp>
       <p:sp>
         <p:nvSpPr>
-          <p:cNvPr id="4" name="日期占位符 3">
-            <a:extLst>
-              <a:ext uri="{FF2B5EF4-FFF2-40B4-BE49-F238E27FC236}">
-                <a16:creationId xmlns:a16="http://schemas.microsoft.com/office/drawing/2014/main" id="{9B4EDE43-AEF1-2776-B579-FACFC83DD642}"/>
-              </a:ext>
-            </a:extLst>
-          </p:cNvPr>
+          <p:cNvPr id="4" name="日期占位符 3"/>
           <p:cNvSpPr>
             <a:spLocks noGrp="1"/>
           </p:cNvSpPr>
@@ -858,7 +747,7 @@
           <a:p>
             <a:fld id="{35278302-CADD-4C61-B105-DF68310DB9E4}" type="datetimeFigureOut">
               <a:rPr lang="zh-CN" altLang="en-US" smtClean="0"/>
-              <a:t>2025/1/22</a:t>
+              <a:t>2025/2/4</a:t>
             </a:fld>
             <a:endParaRPr lang="zh-CN" altLang="en-US"/>
           </a:p>
@@ -866,13 +755,7 @@
       </p:sp>
       <p:sp>
         <p:nvSpPr>
-          <p:cNvPr id="5" name="页脚占位符 4">
-            <a:extLst>
-              <a:ext uri="{FF2B5EF4-FFF2-40B4-BE49-F238E27FC236}">
-                <a16:creationId xmlns:a16="http://schemas.microsoft.com/office/drawing/2014/main" id="{CBD78DA5-8C1C-D273-1D2C-895508E67A88}"/>
-              </a:ext>
-            </a:extLst>
-          </p:cNvPr>
+          <p:cNvPr id="5" name="页脚占位符 4"/>
           <p:cNvSpPr>
             <a:spLocks noGrp="1"/>
           </p:cNvSpPr>
@@ -891,13 +774,7 @@
       </p:sp>
       <p:sp>
         <p:nvSpPr>
-          <p:cNvPr id="6" name="灯片编号占位符 5">
-            <a:extLst>
-              <a:ext uri="{FF2B5EF4-FFF2-40B4-BE49-F238E27FC236}">
-                <a16:creationId xmlns:a16="http://schemas.microsoft.com/office/drawing/2014/main" id="{9B50047F-D813-B072-74CF-E7495D85DE07}"/>
-              </a:ext>
-            </a:extLst>
-          </p:cNvPr>
+          <p:cNvPr id="6" name="灯片编号占位符 5"/>
           <p:cNvSpPr>
             <a:spLocks noGrp="1"/>
           </p:cNvSpPr>
@@ -919,11 +796,6 @@
         </p:txBody>
       </p:sp>
     </p:spTree>
-    <p:extLst>
-      <p:ext uri="{BB962C8B-B14F-4D97-AF65-F5344CB8AC3E}">
-        <p14:creationId xmlns:p14="http://schemas.microsoft.com/office/powerpoint/2010/main" val="124527864"/>
-      </p:ext>
-    </p:extLst>
   </p:cSld>
   <p:clrMapOvr>
     <a:masterClrMapping/>
@@ -950,13 +822,7 @@
       </p:grpSpPr>
       <p:sp>
         <p:nvSpPr>
-          <p:cNvPr id="2" name="标题 1">
-            <a:extLst>
-              <a:ext uri="{FF2B5EF4-FFF2-40B4-BE49-F238E27FC236}">
-                <a16:creationId xmlns:a16="http://schemas.microsoft.com/office/drawing/2014/main" id="{A9DD17B5-E9BB-9A2E-95B9-10A1FC302519}"/>
-              </a:ext>
-            </a:extLst>
-          </p:cNvPr>
+          <p:cNvPr id="2" name="标题 1"/>
           <p:cNvSpPr>
             <a:spLocks noGrp="1"/>
           </p:cNvSpPr>
@@ -987,13 +853,7 @@
       </p:sp>
       <p:sp>
         <p:nvSpPr>
-          <p:cNvPr id="3" name="文本占位符 2">
-            <a:extLst>
-              <a:ext uri="{FF2B5EF4-FFF2-40B4-BE49-F238E27FC236}">
-                <a16:creationId xmlns:a16="http://schemas.microsoft.com/office/drawing/2014/main" id="{CF7D40FA-2DDF-3DD3-0C9D-DAB4797CA2CB}"/>
-              </a:ext>
-            </a:extLst>
-          </p:cNvPr>
+          <p:cNvPr id="3" name="文本占位符 2"/>
           <p:cNvSpPr>
             <a:spLocks noGrp="1"/>
           </p:cNvSpPr>
@@ -1112,13 +972,7 @@
       </p:sp>
       <p:sp>
         <p:nvSpPr>
-          <p:cNvPr id="4" name="日期占位符 3">
-            <a:extLst>
-              <a:ext uri="{FF2B5EF4-FFF2-40B4-BE49-F238E27FC236}">
-                <a16:creationId xmlns:a16="http://schemas.microsoft.com/office/drawing/2014/main" id="{A98D084D-67C5-2F24-336C-DADFFC928C8F}"/>
-              </a:ext>
-            </a:extLst>
-          </p:cNvPr>
+          <p:cNvPr id="4" name="日期占位符 3"/>
           <p:cNvSpPr>
             <a:spLocks noGrp="1"/>
           </p:cNvSpPr>
@@ -1133,7 +987,7 @@
           <a:p>
             <a:fld id="{35278302-CADD-4C61-B105-DF68310DB9E4}" type="datetimeFigureOut">
               <a:rPr lang="zh-CN" altLang="en-US" smtClean="0"/>
-              <a:t>2025/1/22</a:t>
+              <a:t>2025/2/4</a:t>
             </a:fld>
             <a:endParaRPr lang="zh-CN" altLang="en-US"/>
           </a:p>
@@ -1141,13 +995,7 @@
       </p:sp>
       <p:sp>
         <p:nvSpPr>
-          <p:cNvPr id="5" name="页脚占位符 4">
-            <a:extLst>
-              <a:ext uri="{FF2B5EF4-FFF2-40B4-BE49-F238E27FC236}">
-                <a16:creationId xmlns:a16="http://schemas.microsoft.com/office/drawing/2014/main" id="{6A355C54-08F9-A8E9-3AF5-E9E8CDEE7F2D}"/>
-              </a:ext>
-            </a:extLst>
-          </p:cNvPr>
+          <p:cNvPr id="5" name="页脚占位符 4"/>
           <p:cNvSpPr>
             <a:spLocks noGrp="1"/>
           </p:cNvSpPr>
@@ -1166,13 +1014,7 @@
       </p:sp>
       <p:sp>
         <p:nvSpPr>
-          <p:cNvPr id="6" name="灯片编号占位符 5">
-            <a:extLst>
-              <a:ext uri="{FF2B5EF4-FFF2-40B4-BE49-F238E27FC236}">
-                <a16:creationId xmlns:a16="http://schemas.microsoft.com/office/drawing/2014/main" id="{0C06FB3D-5223-0D46-5F35-2C347077A46E}"/>
-              </a:ext>
-            </a:extLst>
-          </p:cNvPr>
+          <p:cNvPr id="6" name="灯片编号占位符 5"/>
           <p:cNvSpPr>
             <a:spLocks noGrp="1"/>
           </p:cNvSpPr>
@@ -1194,11 +1036,6 @@
         </p:txBody>
       </p:sp>
     </p:spTree>
-    <p:extLst>
-      <p:ext uri="{BB962C8B-B14F-4D97-AF65-F5344CB8AC3E}">
-        <p14:creationId xmlns:p14="http://schemas.microsoft.com/office/powerpoint/2010/main" val="2059144596"/>
-      </p:ext>
-    </p:extLst>
   </p:cSld>
   <p:clrMapOvr>
     <a:masterClrMapping/>
@@ -1225,13 +1062,7 @@
       </p:grpSpPr>
       <p:sp>
         <p:nvSpPr>
-          <p:cNvPr id="2" name="标题 1">
-            <a:extLst>
-              <a:ext uri="{FF2B5EF4-FFF2-40B4-BE49-F238E27FC236}">
-                <a16:creationId xmlns:a16="http://schemas.microsoft.com/office/drawing/2014/main" id="{ACC686DF-5A14-C375-0577-F4E81C4DA42B}"/>
-              </a:ext>
-            </a:extLst>
-          </p:cNvPr>
+          <p:cNvPr id="2" name="标题 1"/>
           <p:cNvSpPr>
             <a:spLocks noGrp="1"/>
           </p:cNvSpPr>
@@ -1253,13 +1084,7 @@
       </p:sp>
       <p:sp>
         <p:nvSpPr>
-          <p:cNvPr id="3" name="内容占位符 2">
-            <a:extLst>
-              <a:ext uri="{FF2B5EF4-FFF2-40B4-BE49-F238E27FC236}">
-                <a16:creationId xmlns:a16="http://schemas.microsoft.com/office/drawing/2014/main" id="{AB4D3081-9D6A-E1AA-7BE8-C567FE8EE57B}"/>
-              </a:ext>
-            </a:extLst>
-          </p:cNvPr>
+          <p:cNvPr id="3" name="内容占位符 2"/>
           <p:cNvSpPr>
             <a:spLocks noGrp="1"/>
           </p:cNvSpPr>
@@ -1315,13 +1140,7 @@
       </p:sp>
       <p:sp>
         <p:nvSpPr>
-          <p:cNvPr id="4" name="内容占位符 3">
-            <a:extLst>
-              <a:ext uri="{FF2B5EF4-FFF2-40B4-BE49-F238E27FC236}">
-                <a16:creationId xmlns:a16="http://schemas.microsoft.com/office/drawing/2014/main" id="{5949BAF1-A586-7505-D292-7778001FF16D}"/>
-              </a:ext>
-            </a:extLst>
-          </p:cNvPr>
+          <p:cNvPr id="4" name="内容占位符 3"/>
           <p:cNvSpPr>
             <a:spLocks noGrp="1"/>
           </p:cNvSpPr>
@@ -1377,13 +1196,7 @@
       </p:sp>
       <p:sp>
         <p:nvSpPr>
-          <p:cNvPr id="5" name="日期占位符 4">
-            <a:extLst>
-              <a:ext uri="{FF2B5EF4-FFF2-40B4-BE49-F238E27FC236}">
-                <a16:creationId xmlns:a16="http://schemas.microsoft.com/office/drawing/2014/main" id="{51A8CCD9-E5FE-114C-AE73-991D78A17870}"/>
-              </a:ext>
-            </a:extLst>
-          </p:cNvPr>
+          <p:cNvPr id="5" name="日期占位符 4"/>
           <p:cNvSpPr>
             <a:spLocks noGrp="1"/>
           </p:cNvSpPr>
@@ -1398,7 +1211,7 @@
           <a:p>
             <a:fld id="{35278302-CADD-4C61-B105-DF68310DB9E4}" type="datetimeFigureOut">
               <a:rPr lang="zh-CN" altLang="en-US" smtClean="0"/>
-              <a:t>2025/1/22</a:t>
+              <a:t>2025/2/4</a:t>
             </a:fld>
             <a:endParaRPr lang="zh-CN" altLang="en-US"/>
           </a:p>
@@ -1406,13 +1219,7 @@
       </p:sp>
       <p:sp>
         <p:nvSpPr>
-          <p:cNvPr id="6" name="页脚占位符 5">
-            <a:extLst>
-              <a:ext uri="{FF2B5EF4-FFF2-40B4-BE49-F238E27FC236}">
-                <a16:creationId xmlns:a16="http://schemas.microsoft.com/office/drawing/2014/main" id="{FC6A474A-3DBD-2C99-CCF4-44392EBA9D90}"/>
-              </a:ext>
-            </a:extLst>
-          </p:cNvPr>
+          <p:cNvPr id="6" name="页脚占位符 5"/>
           <p:cNvSpPr>
             <a:spLocks noGrp="1"/>
           </p:cNvSpPr>
@@ -1431,13 +1238,7 @@
       </p:sp>
       <p:sp>
         <p:nvSpPr>
-          <p:cNvPr id="7" name="灯片编号占位符 6">
-            <a:extLst>
-              <a:ext uri="{FF2B5EF4-FFF2-40B4-BE49-F238E27FC236}">
-                <a16:creationId xmlns:a16="http://schemas.microsoft.com/office/drawing/2014/main" id="{2425BB98-48C0-122E-A010-B0F30829440F}"/>
-              </a:ext>
-            </a:extLst>
-          </p:cNvPr>
+          <p:cNvPr id="7" name="灯片编号占位符 6"/>
           <p:cNvSpPr>
             <a:spLocks noGrp="1"/>
           </p:cNvSpPr>
@@ -1459,11 +1260,6 @@
         </p:txBody>
       </p:sp>
     </p:spTree>
-    <p:extLst>
-      <p:ext uri="{BB962C8B-B14F-4D97-AF65-F5344CB8AC3E}">
-        <p14:creationId xmlns:p14="http://schemas.microsoft.com/office/powerpoint/2010/main" val="2479042036"/>
-      </p:ext>
-    </p:extLst>
   </p:cSld>
   <p:clrMapOvr>
     <a:masterClrMapping/>
@@ -1490,13 +1286,7 @@
       </p:grpSpPr>
       <p:sp>
         <p:nvSpPr>
-          <p:cNvPr id="2" name="标题 1">
-            <a:extLst>
-              <a:ext uri="{FF2B5EF4-FFF2-40B4-BE49-F238E27FC236}">
-                <a16:creationId xmlns:a16="http://schemas.microsoft.com/office/drawing/2014/main" id="{CB6F735A-F6EF-1B62-5733-B6485E7C30DD}"/>
-              </a:ext>
-            </a:extLst>
-          </p:cNvPr>
+          <p:cNvPr id="2" name="标题 1"/>
           <p:cNvSpPr>
             <a:spLocks noGrp="1"/>
           </p:cNvSpPr>
@@ -1523,13 +1313,7 @@
       </p:sp>
       <p:sp>
         <p:nvSpPr>
-          <p:cNvPr id="3" name="文本占位符 2">
-            <a:extLst>
-              <a:ext uri="{FF2B5EF4-FFF2-40B4-BE49-F238E27FC236}">
-                <a16:creationId xmlns:a16="http://schemas.microsoft.com/office/drawing/2014/main" id="{418297F4-4570-19B9-D3F5-5392726158E8}"/>
-              </a:ext>
-            </a:extLst>
-          </p:cNvPr>
+          <p:cNvPr id="3" name="文本占位符 2"/>
           <p:cNvSpPr>
             <a:spLocks noGrp="1"/>
           </p:cNvSpPr>
@@ -1594,13 +1378,7 @@
       </p:sp>
       <p:sp>
         <p:nvSpPr>
-          <p:cNvPr id="4" name="内容占位符 3">
-            <a:extLst>
-              <a:ext uri="{FF2B5EF4-FFF2-40B4-BE49-F238E27FC236}">
-                <a16:creationId xmlns:a16="http://schemas.microsoft.com/office/drawing/2014/main" id="{ACAE0AC9-1F88-036B-DA52-D36EF4E60F07}"/>
-              </a:ext>
-            </a:extLst>
-          </p:cNvPr>
+          <p:cNvPr id="4" name="内容占位符 3"/>
           <p:cNvSpPr>
             <a:spLocks noGrp="1"/>
           </p:cNvSpPr>
@@ -1656,13 +1434,7 @@
       </p:sp>
       <p:sp>
         <p:nvSpPr>
-          <p:cNvPr id="5" name="文本占位符 4">
-            <a:extLst>
-              <a:ext uri="{FF2B5EF4-FFF2-40B4-BE49-F238E27FC236}">
-                <a16:creationId xmlns:a16="http://schemas.microsoft.com/office/drawing/2014/main" id="{593167B4-E757-A1A6-17E6-165DF4B787AB}"/>
-              </a:ext>
-            </a:extLst>
-          </p:cNvPr>
+          <p:cNvPr id="5" name="文本占位符 4"/>
           <p:cNvSpPr>
             <a:spLocks noGrp="1"/>
           </p:cNvSpPr>
@@ -1727,13 +1499,7 @@
       </p:sp>
       <p:sp>
         <p:nvSpPr>
-          <p:cNvPr id="6" name="内容占位符 5">
-            <a:extLst>
-              <a:ext uri="{FF2B5EF4-FFF2-40B4-BE49-F238E27FC236}">
-                <a16:creationId xmlns:a16="http://schemas.microsoft.com/office/drawing/2014/main" id="{7794E545-227C-C1C9-BA17-D64B3814CDD9}"/>
-              </a:ext>
-            </a:extLst>
-          </p:cNvPr>
+          <p:cNvPr id="6" name="内容占位符 5"/>
           <p:cNvSpPr>
             <a:spLocks noGrp="1"/>
           </p:cNvSpPr>
@@ -1789,13 +1555,7 @@
       </p:sp>
       <p:sp>
         <p:nvSpPr>
-          <p:cNvPr id="7" name="日期占位符 6">
-            <a:extLst>
-              <a:ext uri="{FF2B5EF4-FFF2-40B4-BE49-F238E27FC236}">
-                <a16:creationId xmlns:a16="http://schemas.microsoft.com/office/drawing/2014/main" id="{611107E3-DD00-5501-BDE1-BEF9E6518442}"/>
-              </a:ext>
-            </a:extLst>
-          </p:cNvPr>
+          <p:cNvPr id="7" name="日期占位符 6"/>
           <p:cNvSpPr>
             <a:spLocks noGrp="1"/>
           </p:cNvSpPr>
@@ -1810,7 +1570,7 @@
           <a:p>
             <a:fld id="{35278302-CADD-4C61-B105-DF68310DB9E4}" type="datetimeFigureOut">
               <a:rPr lang="zh-CN" altLang="en-US" smtClean="0"/>
-              <a:t>2025/1/22</a:t>
+              <a:t>2025/2/4</a:t>
             </a:fld>
             <a:endParaRPr lang="zh-CN" altLang="en-US"/>
           </a:p>
@@ -1818,13 +1578,7 @@
       </p:sp>
       <p:sp>
         <p:nvSpPr>
-          <p:cNvPr id="8" name="页脚占位符 7">
-            <a:extLst>
-              <a:ext uri="{FF2B5EF4-FFF2-40B4-BE49-F238E27FC236}">
-                <a16:creationId xmlns:a16="http://schemas.microsoft.com/office/drawing/2014/main" id="{89CC3920-169F-4198-84CB-60EE00C8AE11}"/>
-              </a:ext>
-            </a:extLst>
-          </p:cNvPr>
+          <p:cNvPr id="8" name="页脚占位符 7"/>
           <p:cNvSpPr>
             <a:spLocks noGrp="1"/>
           </p:cNvSpPr>
@@ -1843,13 +1597,7 @@
       </p:sp>
       <p:sp>
         <p:nvSpPr>
-          <p:cNvPr id="9" name="灯片编号占位符 8">
-            <a:extLst>
-              <a:ext uri="{FF2B5EF4-FFF2-40B4-BE49-F238E27FC236}">
-                <a16:creationId xmlns:a16="http://schemas.microsoft.com/office/drawing/2014/main" id="{711846C6-BF17-324C-474A-7209DBC3E11A}"/>
-              </a:ext>
-            </a:extLst>
-          </p:cNvPr>
+          <p:cNvPr id="9" name="灯片编号占位符 8"/>
           <p:cNvSpPr>
             <a:spLocks noGrp="1"/>
           </p:cNvSpPr>
@@ -1871,11 +1619,6 @@
         </p:txBody>
       </p:sp>
     </p:spTree>
-    <p:extLst>
-      <p:ext uri="{BB962C8B-B14F-4D97-AF65-F5344CB8AC3E}">
-        <p14:creationId xmlns:p14="http://schemas.microsoft.com/office/powerpoint/2010/main" val="2416200360"/>
-      </p:ext>
-    </p:extLst>
   </p:cSld>
   <p:clrMapOvr>
     <a:masterClrMapping/>
@@ -1902,13 +1645,7 @@
       </p:grpSpPr>
       <p:sp>
         <p:nvSpPr>
-          <p:cNvPr id="2" name="标题 1">
-            <a:extLst>
-              <a:ext uri="{FF2B5EF4-FFF2-40B4-BE49-F238E27FC236}">
-                <a16:creationId xmlns:a16="http://schemas.microsoft.com/office/drawing/2014/main" id="{4EB30FF6-D0E5-E187-0A0C-4AD0D7AC7BF0}"/>
-              </a:ext>
-            </a:extLst>
-          </p:cNvPr>
+          <p:cNvPr id="2" name="标题 1"/>
           <p:cNvSpPr>
             <a:spLocks noGrp="1"/>
           </p:cNvSpPr>
@@ -1930,13 +1667,7 @@
       </p:sp>
       <p:sp>
         <p:nvSpPr>
-          <p:cNvPr id="3" name="日期占位符 2">
-            <a:extLst>
-              <a:ext uri="{FF2B5EF4-FFF2-40B4-BE49-F238E27FC236}">
-                <a16:creationId xmlns:a16="http://schemas.microsoft.com/office/drawing/2014/main" id="{20371049-38C9-1E19-7132-4B222313E239}"/>
-              </a:ext>
-            </a:extLst>
-          </p:cNvPr>
+          <p:cNvPr id="3" name="日期占位符 2"/>
           <p:cNvSpPr>
             <a:spLocks noGrp="1"/>
           </p:cNvSpPr>
@@ -1951,7 +1682,7 @@
           <a:p>
             <a:fld id="{35278302-CADD-4C61-B105-DF68310DB9E4}" type="datetimeFigureOut">
               <a:rPr lang="zh-CN" altLang="en-US" smtClean="0"/>
-              <a:t>2025/1/22</a:t>
+              <a:t>2025/2/4</a:t>
             </a:fld>
             <a:endParaRPr lang="zh-CN" altLang="en-US"/>
           </a:p>
@@ -1959,13 +1690,7 @@
       </p:sp>
       <p:sp>
         <p:nvSpPr>
-          <p:cNvPr id="4" name="页脚占位符 3">
-            <a:extLst>
-              <a:ext uri="{FF2B5EF4-FFF2-40B4-BE49-F238E27FC236}">
-                <a16:creationId xmlns:a16="http://schemas.microsoft.com/office/drawing/2014/main" id="{B1A7F18C-4FE5-78F7-2509-B8732B42BE77}"/>
-              </a:ext>
-            </a:extLst>
-          </p:cNvPr>
+          <p:cNvPr id="4" name="页脚占位符 3"/>
           <p:cNvSpPr>
             <a:spLocks noGrp="1"/>
           </p:cNvSpPr>
@@ -1984,13 +1709,7 @@
       </p:sp>
       <p:sp>
         <p:nvSpPr>
-          <p:cNvPr id="5" name="灯片编号占位符 4">
-            <a:extLst>
-              <a:ext uri="{FF2B5EF4-FFF2-40B4-BE49-F238E27FC236}">
-                <a16:creationId xmlns:a16="http://schemas.microsoft.com/office/drawing/2014/main" id="{EDCD2BA4-DFB9-26E1-C284-1C75DBCDAD76}"/>
-              </a:ext>
-            </a:extLst>
-          </p:cNvPr>
+          <p:cNvPr id="5" name="灯片编号占位符 4"/>
           <p:cNvSpPr>
             <a:spLocks noGrp="1"/>
           </p:cNvSpPr>
@@ -2012,11 +1731,6 @@
         </p:txBody>
       </p:sp>
     </p:spTree>
-    <p:extLst>
-      <p:ext uri="{BB962C8B-B14F-4D97-AF65-F5344CB8AC3E}">
-        <p14:creationId xmlns:p14="http://schemas.microsoft.com/office/powerpoint/2010/main" val="761778398"/>
-      </p:ext>
-    </p:extLst>
   </p:cSld>
   <p:clrMapOvr>
     <a:masterClrMapping/>
@@ -2043,13 +1757,7 @@
       </p:grpSpPr>
       <p:sp>
         <p:nvSpPr>
-          <p:cNvPr id="2" name="日期占位符 1">
-            <a:extLst>
-              <a:ext uri="{FF2B5EF4-FFF2-40B4-BE49-F238E27FC236}">
-                <a16:creationId xmlns:a16="http://schemas.microsoft.com/office/drawing/2014/main" id="{01A6E5B2-76A1-F2A8-9948-BD2FEB2FA035}"/>
-              </a:ext>
-            </a:extLst>
-          </p:cNvPr>
+          <p:cNvPr id="2" name="日期占位符 1"/>
           <p:cNvSpPr>
             <a:spLocks noGrp="1"/>
           </p:cNvSpPr>
@@ -2064,7 +1772,7 @@
           <a:p>
             <a:fld id="{35278302-CADD-4C61-B105-DF68310DB9E4}" type="datetimeFigureOut">
               <a:rPr lang="zh-CN" altLang="en-US" smtClean="0"/>
-              <a:t>2025/1/22</a:t>
+              <a:t>2025/2/4</a:t>
             </a:fld>
             <a:endParaRPr lang="zh-CN" altLang="en-US"/>
           </a:p>
@@ -2072,13 +1780,7 @@
       </p:sp>
       <p:sp>
         <p:nvSpPr>
-          <p:cNvPr id="3" name="页脚占位符 2">
-            <a:extLst>
-              <a:ext uri="{FF2B5EF4-FFF2-40B4-BE49-F238E27FC236}">
-                <a16:creationId xmlns:a16="http://schemas.microsoft.com/office/drawing/2014/main" id="{22A2C0CA-A27E-824C-E802-256EF894F6B0}"/>
-              </a:ext>
-            </a:extLst>
-          </p:cNvPr>
+          <p:cNvPr id="3" name="页脚占位符 2"/>
           <p:cNvSpPr>
             <a:spLocks noGrp="1"/>
           </p:cNvSpPr>
@@ -2097,13 +1799,7 @@
       </p:sp>
       <p:sp>
         <p:nvSpPr>
-          <p:cNvPr id="4" name="灯片编号占位符 3">
-            <a:extLst>
-              <a:ext uri="{FF2B5EF4-FFF2-40B4-BE49-F238E27FC236}">
-                <a16:creationId xmlns:a16="http://schemas.microsoft.com/office/drawing/2014/main" id="{84546A1F-57A4-5656-A03B-DA0C84E411CB}"/>
-              </a:ext>
-            </a:extLst>
-          </p:cNvPr>
+          <p:cNvPr id="4" name="灯片编号占位符 3"/>
           <p:cNvSpPr>
             <a:spLocks noGrp="1"/>
           </p:cNvSpPr>
@@ -2125,11 +1821,6 @@
         </p:txBody>
       </p:sp>
     </p:spTree>
-    <p:extLst>
-      <p:ext uri="{BB962C8B-B14F-4D97-AF65-F5344CB8AC3E}">
-        <p14:creationId xmlns:p14="http://schemas.microsoft.com/office/powerpoint/2010/main" val="3528010402"/>
-      </p:ext>
-    </p:extLst>
   </p:cSld>
   <p:clrMapOvr>
     <a:masterClrMapping/>
@@ -2156,13 +1847,7 @@
       </p:grpSpPr>
       <p:sp>
         <p:nvSpPr>
-          <p:cNvPr id="2" name="标题 1">
-            <a:extLst>
-              <a:ext uri="{FF2B5EF4-FFF2-40B4-BE49-F238E27FC236}">
-                <a16:creationId xmlns:a16="http://schemas.microsoft.com/office/drawing/2014/main" id="{3E450FDF-6940-AABF-5B9E-BCDC1D756866}"/>
-              </a:ext>
-            </a:extLst>
-          </p:cNvPr>
+          <p:cNvPr id="2" name="标题 1"/>
           <p:cNvSpPr>
             <a:spLocks noGrp="1"/>
           </p:cNvSpPr>
@@ -2193,13 +1878,7 @@
       </p:sp>
       <p:sp>
         <p:nvSpPr>
-          <p:cNvPr id="3" name="内容占位符 2">
-            <a:extLst>
-              <a:ext uri="{FF2B5EF4-FFF2-40B4-BE49-F238E27FC236}">
-                <a16:creationId xmlns:a16="http://schemas.microsoft.com/office/drawing/2014/main" id="{6BD2F5BE-A473-20A6-FA3B-A32D3231F97B}"/>
-              </a:ext>
-            </a:extLst>
-          </p:cNvPr>
+          <p:cNvPr id="3" name="内容占位符 2"/>
           <p:cNvSpPr>
             <a:spLocks noGrp="1"/>
           </p:cNvSpPr>
@@ -2283,13 +1962,7 @@
       </p:sp>
       <p:sp>
         <p:nvSpPr>
-          <p:cNvPr id="4" name="文本占位符 3">
-            <a:extLst>
-              <a:ext uri="{FF2B5EF4-FFF2-40B4-BE49-F238E27FC236}">
-                <a16:creationId xmlns:a16="http://schemas.microsoft.com/office/drawing/2014/main" id="{C0B24497-3E8D-3C11-C722-1E0D836BD13B}"/>
-              </a:ext>
-            </a:extLst>
-          </p:cNvPr>
+          <p:cNvPr id="4" name="文本占位符 3"/>
           <p:cNvSpPr>
             <a:spLocks noGrp="1"/>
           </p:cNvSpPr>
@@ -2354,13 +2027,7 @@
       </p:sp>
       <p:sp>
         <p:nvSpPr>
-          <p:cNvPr id="5" name="日期占位符 4">
-            <a:extLst>
-              <a:ext uri="{FF2B5EF4-FFF2-40B4-BE49-F238E27FC236}">
-                <a16:creationId xmlns:a16="http://schemas.microsoft.com/office/drawing/2014/main" id="{CD5BE3C4-084D-3968-852E-0E65A687A2C5}"/>
-              </a:ext>
-            </a:extLst>
-          </p:cNvPr>
+          <p:cNvPr id="5" name="日期占位符 4"/>
           <p:cNvSpPr>
             <a:spLocks noGrp="1"/>
           </p:cNvSpPr>
@@ -2375,7 +2042,7 @@
           <a:p>
             <a:fld id="{35278302-CADD-4C61-B105-DF68310DB9E4}" type="datetimeFigureOut">
               <a:rPr lang="zh-CN" altLang="en-US" smtClean="0"/>
-              <a:t>2025/1/22</a:t>
+              <a:t>2025/2/4</a:t>
             </a:fld>
             <a:endParaRPr lang="zh-CN" altLang="en-US"/>
           </a:p>
@@ -2383,13 +2050,7 @@
       </p:sp>
       <p:sp>
         <p:nvSpPr>
-          <p:cNvPr id="6" name="页脚占位符 5">
-            <a:extLst>
-              <a:ext uri="{FF2B5EF4-FFF2-40B4-BE49-F238E27FC236}">
-                <a16:creationId xmlns:a16="http://schemas.microsoft.com/office/drawing/2014/main" id="{7A8B8255-9FD8-B1B7-F96E-5518C9FCCA3F}"/>
-              </a:ext>
-            </a:extLst>
-          </p:cNvPr>
+          <p:cNvPr id="6" name="页脚占位符 5"/>
           <p:cNvSpPr>
             <a:spLocks noGrp="1"/>
           </p:cNvSpPr>
@@ -2408,13 +2069,7 @@
       </p:sp>
       <p:sp>
         <p:nvSpPr>
-          <p:cNvPr id="7" name="灯片编号占位符 6">
-            <a:extLst>
-              <a:ext uri="{FF2B5EF4-FFF2-40B4-BE49-F238E27FC236}">
-                <a16:creationId xmlns:a16="http://schemas.microsoft.com/office/drawing/2014/main" id="{E05905B9-4250-73F8-E774-55EEFB2D679D}"/>
-              </a:ext>
-            </a:extLst>
-          </p:cNvPr>
+          <p:cNvPr id="7" name="灯片编号占位符 6"/>
           <p:cNvSpPr>
             <a:spLocks noGrp="1"/>
           </p:cNvSpPr>
@@ -2436,11 +2091,6 @@
         </p:txBody>
       </p:sp>
     </p:spTree>
-    <p:extLst>
-      <p:ext uri="{BB962C8B-B14F-4D97-AF65-F5344CB8AC3E}">
-        <p14:creationId xmlns:p14="http://schemas.microsoft.com/office/powerpoint/2010/main" val="2885499770"/>
-      </p:ext>
-    </p:extLst>
   </p:cSld>
   <p:clrMapOvr>
     <a:masterClrMapping/>
@@ -2467,13 +2117,7 @@
       </p:grpSpPr>
       <p:sp>
         <p:nvSpPr>
-          <p:cNvPr id="2" name="标题 1">
-            <a:extLst>
-              <a:ext uri="{FF2B5EF4-FFF2-40B4-BE49-F238E27FC236}">
-                <a16:creationId xmlns:a16="http://schemas.microsoft.com/office/drawing/2014/main" id="{E781C246-2B7C-05F0-3F60-EB1441E8BEAF}"/>
-              </a:ext>
-            </a:extLst>
-          </p:cNvPr>
+          <p:cNvPr id="2" name="标题 1"/>
           <p:cNvSpPr>
             <a:spLocks noGrp="1"/>
           </p:cNvSpPr>
@@ -2504,13 +2148,7 @@
       </p:sp>
       <p:sp>
         <p:nvSpPr>
-          <p:cNvPr id="3" name="图片占位符 2">
-            <a:extLst>
-              <a:ext uri="{FF2B5EF4-FFF2-40B4-BE49-F238E27FC236}">
-                <a16:creationId xmlns:a16="http://schemas.microsoft.com/office/drawing/2014/main" id="{BD5BDDF9-3687-A64A-D5BD-13FBAC0ADCA0}"/>
-              </a:ext>
-            </a:extLst>
-          </p:cNvPr>
+          <p:cNvPr id="3" name="图片占位符 2"/>
           <p:cNvSpPr>
             <a:spLocks noGrp="1"/>
           </p:cNvSpPr>
@@ -2571,13 +2209,7 @@
       </p:sp>
       <p:sp>
         <p:nvSpPr>
-          <p:cNvPr id="4" name="文本占位符 3">
-            <a:extLst>
-              <a:ext uri="{FF2B5EF4-FFF2-40B4-BE49-F238E27FC236}">
-                <a16:creationId xmlns:a16="http://schemas.microsoft.com/office/drawing/2014/main" id="{2E360672-3F41-DBA9-6202-ABA01F960094}"/>
-              </a:ext>
-            </a:extLst>
-          </p:cNvPr>
+          <p:cNvPr id="4" name="文本占位符 3"/>
           <p:cNvSpPr>
             <a:spLocks noGrp="1"/>
           </p:cNvSpPr>
@@ -2642,13 +2274,7 @@
       </p:sp>
       <p:sp>
         <p:nvSpPr>
-          <p:cNvPr id="5" name="日期占位符 4">
-            <a:extLst>
-              <a:ext uri="{FF2B5EF4-FFF2-40B4-BE49-F238E27FC236}">
-                <a16:creationId xmlns:a16="http://schemas.microsoft.com/office/drawing/2014/main" id="{92B3A2DC-C9D2-524B-CEEB-B491638F3CF7}"/>
-              </a:ext>
-            </a:extLst>
-          </p:cNvPr>
+          <p:cNvPr id="5" name="日期占位符 4"/>
           <p:cNvSpPr>
             <a:spLocks noGrp="1"/>
           </p:cNvSpPr>
@@ -2663,7 +2289,7 @@
           <a:p>
             <a:fld id="{35278302-CADD-4C61-B105-DF68310DB9E4}" type="datetimeFigureOut">
               <a:rPr lang="zh-CN" altLang="en-US" smtClean="0"/>
-              <a:t>2025/1/22</a:t>
+              <a:t>2025/2/4</a:t>
             </a:fld>
             <a:endParaRPr lang="zh-CN" altLang="en-US"/>
           </a:p>
@@ -2671,13 +2297,7 @@
       </p:sp>
       <p:sp>
         <p:nvSpPr>
-          <p:cNvPr id="6" name="页脚占位符 5">
-            <a:extLst>
-              <a:ext uri="{FF2B5EF4-FFF2-40B4-BE49-F238E27FC236}">
-                <a16:creationId xmlns:a16="http://schemas.microsoft.com/office/drawing/2014/main" id="{5451BA54-B0B9-D95B-55D3-13097D3E3DC5}"/>
-              </a:ext>
-            </a:extLst>
-          </p:cNvPr>
+          <p:cNvPr id="6" name="页脚占位符 5"/>
           <p:cNvSpPr>
             <a:spLocks noGrp="1"/>
           </p:cNvSpPr>
@@ -2696,13 +2316,7 @@
       </p:sp>
       <p:sp>
         <p:nvSpPr>
-          <p:cNvPr id="7" name="灯片编号占位符 6">
-            <a:extLst>
-              <a:ext uri="{FF2B5EF4-FFF2-40B4-BE49-F238E27FC236}">
-                <a16:creationId xmlns:a16="http://schemas.microsoft.com/office/drawing/2014/main" id="{8855A5CD-737B-E3E0-4F63-FDF7BBC2292A}"/>
-              </a:ext>
-            </a:extLst>
-          </p:cNvPr>
+          <p:cNvPr id="7" name="灯片编号占位符 6"/>
           <p:cNvSpPr>
             <a:spLocks noGrp="1"/>
           </p:cNvSpPr>
@@ -2724,11 +2338,6 @@
         </p:txBody>
       </p:sp>
     </p:spTree>
-    <p:extLst>
-      <p:ext uri="{BB962C8B-B14F-4D97-AF65-F5344CB8AC3E}">
-        <p14:creationId xmlns:p14="http://schemas.microsoft.com/office/powerpoint/2010/main" val="4003477537"/>
-      </p:ext>
-    </p:extLst>
   </p:cSld>
   <p:clrMapOvr>
     <a:masterClrMapping/>
@@ -2760,13 +2369,7 @@
       </p:grpSpPr>
       <p:sp>
         <p:nvSpPr>
-          <p:cNvPr id="2" name="标题占位符 1">
-            <a:extLst>
-              <a:ext uri="{FF2B5EF4-FFF2-40B4-BE49-F238E27FC236}">
-                <a16:creationId xmlns:a16="http://schemas.microsoft.com/office/drawing/2014/main" id="{AE1EAE29-1FB6-5435-76D0-6115CA319F36}"/>
-              </a:ext>
-            </a:extLst>
-          </p:cNvPr>
+          <p:cNvPr id="2" name="标题占位符 1"/>
           <p:cNvSpPr>
             <a:spLocks noGrp="1"/>
           </p:cNvSpPr>
@@ -2798,13 +2401,7 @@
       </p:sp>
       <p:sp>
         <p:nvSpPr>
-          <p:cNvPr id="3" name="文本占位符 2">
-            <a:extLst>
-              <a:ext uri="{FF2B5EF4-FFF2-40B4-BE49-F238E27FC236}">
-                <a16:creationId xmlns:a16="http://schemas.microsoft.com/office/drawing/2014/main" id="{847A8D22-FFEF-8579-B599-376632F597CB}"/>
-              </a:ext>
-            </a:extLst>
-          </p:cNvPr>
+          <p:cNvPr id="3" name="文本占位符 2"/>
           <p:cNvSpPr>
             <a:spLocks noGrp="1"/>
           </p:cNvSpPr>
@@ -2865,13 +2462,7 @@
       </p:sp>
       <p:sp>
         <p:nvSpPr>
-          <p:cNvPr id="4" name="日期占位符 3">
-            <a:extLst>
-              <a:ext uri="{FF2B5EF4-FFF2-40B4-BE49-F238E27FC236}">
-                <a16:creationId xmlns:a16="http://schemas.microsoft.com/office/drawing/2014/main" id="{7927A23F-FFE9-A8C4-F36D-E2B1995FC01E}"/>
-              </a:ext>
-            </a:extLst>
-          </p:cNvPr>
+          <p:cNvPr id="4" name="日期占位符 3"/>
           <p:cNvSpPr>
             <a:spLocks noGrp="1"/>
           </p:cNvSpPr>
@@ -2904,7 +2495,7 @@
           <a:p>
             <a:fld id="{35278302-CADD-4C61-B105-DF68310DB9E4}" type="datetimeFigureOut">
               <a:rPr lang="zh-CN" altLang="en-US" smtClean="0"/>
-              <a:t>2025/1/22</a:t>
+              <a:t>2025/2/4</a:t>
             </a:fld>
             <a:endParaRPr lang="zh-CN" altLang="en-US"/>
           </a:p>
@@ -2912,13 +2503,7 @@
       </p:sp>
       <p:sp>
         <p:nvSpPr>
-          <p:cNvPr id="5" name="页脚占位符 4">
-            <a:extLst>
-              <a:ext uri="{FF2B5EF4-FFF2-40B4-BE49-F238E27FC236}">
-                <a16:creationId xmlns:a16="http://schemas.microsoft.com/office/drawing/2014/main" id="{0CE12159-680F-92D9-BC4E-ADBBBDD1C42E}"/>
-              </a:ext>
-            </a:extLst>
-          </p:cNvPr>
+          <p:cNvPr id="5" name="页脚占位符 4"/>
           <p:cNvSpPr>
             <a:spLocks noGrp="1"/>
           </p:cNvSpPr>
@@ -2955,13 +2540,7 @@
       </p:sp>
       <p:sp>
         <p:nvSpPr>
-          <p:cNvPr id="6" name="灯片编号占位符 5">
-            <a:extLst>
-              <a:ext uri="{FF2B5EF4-FFF2-40B4-BE49-F238E27FC236}">
-                <a16:creationId xmlns:a16="http://schemas.microsoft.com/office/drawing/2014/main" id="{5F6A10CD-30B5-C2B1-62DA-5C6C887AB307}"/>
-              </a:ext>
-            </a:extLst>
-          </p:cNvPr>
+          <p:cNvPr id="6" name="灯片编号占位符 5"/>
           <p:cNvSpPr>
             <a:spLocks noGrp="1"/>
           </p:cNvSpPr>
@@ -3001,11 +2580,6 @@
         </p:txBody>
       </p:sp>
     </p:spTree>
-    <p:extLst>
-      <p:ext uri="{BB962C8B-B14F-4D97-AF65-F5344CB8AC3E}">
-        <p14:creationId xmlns:p14="http://schemas.microsoft.com/office/powerpoint/2010/main" val="1193012850"/>
-      </p:ext>
-    </p:extLst>
   </p:cSld>
   <p:clrMap bg1="lt1" tx1="dk1" bg2="lt2" tx2="dk2" accent1="accent1" accent2="accent2" accent3="accent3" accent4="accent4" accent5="accent5" accent6="accent6" hlink="hlink" folHlink="folHlink"/>
   <p:sldLayoutIdLst>
@@ -3326,7 +2900,7 @@
           <p:cNvPr id="2" name="文本框 1">
             <a:extLst>
               <a:ext uri="{FF2B5EF4-FFF2-40B4-BE49-F238E27FC236}">
-                <a16:creationId xmlns:a16="http://schemas.microsoft.com/office/drawing/2014/main" id="{FB3842A2-CC5D-D4EC-18E1-CADC203BCF08}"/>
+                <a16:creationId xmlns:a16="http://schemas.microsoft.com/office/drawing/2014/main" id="{7EC3538B-35F4-7A88-EA1E-315B0630F24B}"/>
               </a:ext>
             </a:extLst>
           </p:cNvPr>
@@ -3335,8 +2909,8 @@
         </p:nvSpPr>
         <p:spPr>
           <a:xfrm>
-            <a:off x="475989" y="2587803"/>
-            <a:ext cx="11533927" cy="2246769"/>
+            <a:off x="681180" y="1766792"/>
+            <a:ext cx="11134779" cy="2862322"/>
           </a:xfrm>
           <a:prstGeom prst="rect">
             <a:avLst/>
@@ -3350,17 +2924,17 @@
           <a:lstStyle/>
           <a:p>
             <a:r>
-              <a:rPr lang="en-US" altLang="zh-CN" sz="14000" dirty="0"/>
-              <a:t>839264289364</a:t>
-            </a:r>
-            <a:endParaRPr lang="zh-CN" altLang="en-US" sz="14000" dirty="0"/>
+              <a:rPr lang="en-US" altLang="zh-CN" sz="18000" dirty="0"/>
+              <a:t>100066997</a:t>
+            </a:r>
+            <a:endParaRPr lang="zh-CN" altLang="en-US" sz="18000" dirty="0"/>
           </a:p>
         </p:txBody>
       </p:sp>
     </p:spTree>
     <p:extLst>
       <p:ext uri="{BB962C8B-B14F-4D97-AF65-F5344CB8AC3E}">
-        <p14:creationId xmlns:p14="http://schemas.microsoft.com/office/powerpoint/2010/main" val="128686315"/>
+        <p14:creationId xmlns:p14="http://schemas.microsoft.com/office/powerpoint/2010/main" val="4145346658"/>
       </p:ext>
     </p:extLst>
   </p:cSld>
@@ -3368,6 +2942,283 @@
     <a:masterClrMapping/>
   </p:clrMapOvr>
 </p:sld>
+</file>
+
+<file path=ppt/slides/slide2.xml><?xml version="1.0" encoding="utf-8"?>
+<p:sld xmlns:a="http://schemas.openxmlformats.org/drawingml/2006/main" xmlns:r="http://schemas.openxmlformats.org/officeDocument/2006/relationships" xmlns:p="http://schemas.openxmlformats.org/presentationml/2006/main">
+  <p:cSld>
+    <p:spTree>
+      <p:nvGrpSpPr>
+        <p:cNvPr id="1" name=""/>
+        <p:cNvGrpSpPr/>
+        <p:nvPr/>
+      </p:nvGrpSpPr>
+      <p:grpSpPr>
+        <a:xfrm>
+          <a:off x="0" y="0"/>
+          <a:ext cx="0" cy="0"/>
+          <a:chOff x="0" y="0"/>
+          <a:chExt cx="0" cy="0"/>
+        </a:xfrm>
+      </p:grpSpPr>
+      <p:sp>
+        <p:nvSpPr>
+          <p:cNvPr id="2" name="文本框 1"/>
+          <p:cNvSpPr txBox="1"/>
+          <p:nvPr/>
+        </p:nvSpPr>
+        <p:spPr>
+          <a:xfrm>
+            <a:off x="1808523" y="889970"/>
+            <a:ext cx="8696611" cy="2246769"/>
+          </a:xfrm>
+          <a:prstGeom prst="rect">
+            <a:avLst/>
+          </a:prstGeom>
+          <a:noFill/>
+        </p:spPr>
+        <p:txBody>
+          <a:bodyPr wrap="none" rtlCol="0">
+            <a:spAutoFit/>
+          </a:bodyPr>
+          <a:lstStyle/>
+          <a:p>
+            <a:r>
+              <a:rPr lang="en-US" altLang="zh-CN" sz="14000" dirty="0"/>
+              <a:t>392640371</a:t>
+            </a:r>
+            <a:endParaRPr lang="zh-CN" altLang="en-US" sz="14000" dirty="0"/>
+          </a:p>
+        </p:txBody>
+      </p:sp>
+    </p:spTree>
+  </p:cSld>
+  <p:clrMapOvr>
+    <a:masterClrMapping/>
+  </p:clrMapOvr>
+</p:sld>
+</file>
+
+<file path=ppt/slides/slide3.xml><?xml version="1.0" encoding="utf-8"?>
+<p:sld xmlns:a="http://schemas.openxmlformats.org/drawingml/2006/main" xmlns:r="http://schemas.openxmlformats.org/officeDocument/2006/relationships" xmlns:p="http://schemas.openxmlformats.org/presentationml/2006/main">
+  <p:cSld>
+    <p:spTree>
+      <p:nvGrpSpPr>
+        <p:cNvPr id="1" name="">
+          <a:extLst>
+            <a:ext uri="{FF2B5EF4-FFF2-40B4-BE49-F238E27FC236}">
+              <a16:creationId xmlns:a16="http://schemas.microsoft.com/office/drawing/2014/main" id="{908F3E07-DE70-669D-C563-758574C0821D}"/>
+            </a:ext>
+          </a:extLst>
+        </p:cNvPr>
+        <p:cNvGrpSpPr/>
+        <p:nvPr/>
+      </p:nvGrpSpPr>
+      <p:grpSpPr>
+        <a:xfrm>
+          <a:off x="0" y="0"/>
+          <a:ext cx="0" cy="0"/>
+          <a:chOff x="0" y="0"/>
+          <a:chExt cx="0" cy="0"/>
+        </a:xfrm>
+      </p:grpSpPr>
+      <p:sp>
+        <p:nvSpPr>
+          <p:cNvPr id="2" name="文本框 1">
+            <a:extLst>
+              <a:ext uri="{FF2B5EF4-FFF2-40B4-BE49-F238E27FC236}">
+                <a16:creationId xmlns:a16="http://schemas.microsoft.com/office/drawing/2014/main" id="{3C7CD712-21DE-3A73-AC1A-FF281CF49624}"/>
+              </a:ext>
+            </a:extLst>
+          </p:cNvPr>
+          <p:cNvSpPr txBox="1"/>
+          <p:nvPr/>
+        </p:nvSpPr>
+        <p:spPr>
+          <a:xfrm rot="795355">
+            <a:off x="1720842" y="2217729"/>
+            <a:ext cx="8650710" cy="2246769"/>
+          </a:xfrm>
+          <a:prstGeom prst="rect">
+            <a:avLst/>
+          </a:prstGeom>
+          <a:noFill/>
+        </p:spPr>
+        <p:txBody>
+          <a:bodyPr wrap="square" rtlCol="0">
+            <a:spAutoFit/>
+          </a:bodyPr>
+          <a:lstStyle/>
+          <a:p>
+            <a:r>
+              <a:rPr lang="en-US" altLang="zh-CN" sz="14000" dirty="0"/>
+              <a:t>734656223</a:t>
+            </a:r>
+            <a:endParaRPr lang="zh-CN" altLang="en-US" sz="14000" dirty="0"/>
+          </a:p>
+        </p:txBody>
+      </p:sp>
+    </p:spTree>
+    <p:extLst>
+      <p:ext uri="{BB962C8B-B14F-4D97-AF65-F5344CB8AC3E}">
+        <p14:creationId xmlns:p14="http://schemas.microsoft.com/office/powerpoint/2010/main" val="3096317643"/>
+      </p:ext>
+    </p:extLst>
+  </p:cSld>
+  <p:clrMapOvr>
+    <a:masterClrMapping/>
+  </p:clrMapOvr>
+</p:sld>
+</file>
+
+<file path=ppt/slides/slide4.xml><?xml version="1.0" encoding="utf-8"?>
+<p:sld xmlns:a="http://schemas.openxmlformats.org/drawingml/2006/main" xmlns:r="http://schemas.openxmlformats.org/officeDocument/2006/relationships" xmlns:p="http://schemas.openxmlformats.org/presentationml/2006/main">
+  <p:cSld>
+    <p:spTree>
+      <p:nvGrpSpPr>
+        <p:cNvPr id="1" name="">
+          <a:extLst>
+            <a:ext uri="{FF2B5EF4-FFF2-40B4-BE49-F238E27FC236}">
+              <a16:creationId xmlns:a16="http://schemas.microsoft.com/office/drawing/2014/main" id="{E78E8A3A-4EF4-918B-B5D9-E3D2102FBB3B}"/>
+            </a:ext>
+          </a:extLst>
+        </p:cNvPr>
+        <p:cNvGrpSpPr/>
+        <p:nvPr/>
+      </p:nvGrpSpPr>
+      <p:grpSpPr>
+        <a:xfrm>
+          <a:off x="0" y="0"/>
+          <a:ext cx="0" cy="0"/>
+          <a:chOff x="0" y="0"/>
+          <a:chExt cx="0" cy="0"/>
+        </a:xfrm>
+      </p:grpSpPr>
+      <p:sp>
+        <p:nvSpPr>
+          <p:cNvPr id="2" name="文本框 1">
+            <a:extLst>
+              <a:ext uri="{FF2B5EF4-FFF2-40B4-BE49-F238E27FC236}">
+                <a16:creationId xmlns:a16="http://schemas.microsoft.com/office/drawing/2014/main" id="{192B8578-39D4-7981-1E3B-8C3C4109BC96}"/>
+              </a:ext>
+            </a:extLst>
+          </p:cNvPr>
+          <p:cNvSpPr txBox="1"/>
+          <p:nvPr/>
+        </p:nvSpPr>
+        <p:spPr>
+          <a:xfrm>
+            <a:off x="0" y="940074"/>
+            <a:ext cx="12226891" cy="1631216"/>
+          </a:xfrm>
+          <a:prstGeom prst="rect">
+            <a:avLst/>
+          </a:prstGeom>
+          <a:noFill/>
+        </p:spPr>
+        <p:txBody>
+          <a:bodyPr wrap="square" rtlCol="0">
+            <a:spAutoFit/>
+          </a:bodyPr>
+          <a:lstStyle/>
+          <a:p>
+            <a:r>
+              <a:rPr lang="en-US" altLang="zh-CN" sz="10000" dirty="0"/>
+              <a:t>156133215462131794</a:t>
+            </a:r>
+            <a:endParaRPr lang="zh-CN" altLang="en-US" sz="10000" dirty="0"/>
+          </a:p>
+        </p:txBody>
+      </p:sp>
+    </p:spTree>
+    <p:extLst>
+      <p:ext uri="{BB962C8B-B14F-4D97-AF65-F5344CB8AC3E}">
+        <p14:creationId xmlns:p14="http://schemas.microsoft.com/office/powerpoint/2010/main" val="2642650422"/>
+      </p:ext>
+    </p:extLst>
+  </p:cSld>
+  <p:clrMapOvr>
+    <a:masterClrMapping/>
+  </p:clrMapOvr>
+</p:sld>
+</file>
+
+<file path=ppt/slides/slide5.xml><?xml version="1.0" encoding="utf-8"?>
+<p:sld xmlns:a="http://schemas.openxmlformats.org/drawingml/2006/main" xmlns:r="http://schemas.openxmlformats.org/officeDocument/2006/relationships" xmlns:p="http://schemas.openxmlformats.org/presentationml/2006/main">
+  <p:cSld>
+    <p:spTree>
+      <p:nvGrpSpPr>
+        <p:cNvPr id="1" name="">
+          <a:extLst>
+            <a:ext uri="{FF2B5EF4-FFF2-40B4-BE49-F238E27FC236}">
+              <a16:creationId xmlns:a16="http://schemas.microsoft.com/office/drawing/2014/main" id="{FAA63D12-6376-07F2-17D0-2034280A4DFE}"/>
+            </a:ext>
+          </a:extLst>
+        </p:cNvPr>
+        <p:cNvGrpSpPr/>
+        <p:nvPr/>
+      </p:nvGrpSpPr>
+      <p:grpSpPr>
+        <a:xfrm>
+          <a:off x="0" y="0"/>
+          <a:ext cx="0" cy="0"/>
+          <a:chOff x="0" y="0"/>
+          <a:chExt cx="0" cy="0"/>
+        </a:xfrm>
+      </p:grpSpPr>
+      <p:sp>
+        <p:nvSpPr>
+          <p:cNvPr id="2" name="文本框 1">
+            <a:extLst>
+              <a:ext uri="{FF2B5EF4-FFF2-40B4-BE49-F238E27FC236}">
+                <a16:creationId xmlns:a16="http://schemas.microsoft.com/office/drawing/2014/main" id="{CA7A0D7F-65A8-B2A8-6A2A-07C6C14A8371}"/>
+              </a:ext>
+            </a:extLst>
+          </p:cNvPr>
+          <p:cNvSpPr txBox="1"/>
+          <p:nvPr/>
+        </p:nvSpPr>
+        <p:spPr>
+          <a:xfrm rot="19809958">
+            <a:off x="367974" y="2173888"/>
+            <a:ext cx="10588155" cy="2246769"/>
+          </a:xfrm>
+          <a:prstGeom prst="rect">
+            <a:avLst/>
+          </a:prstGeom>
+          <a:noFill/>
+        </p:spPr>
+        <p:txBody>
+          <a:bodyPr wrap="none" rtlCol="0">
+            <a:spAutoFit/>
+          </a:bodyPr>
+          <a:lstStyle/>
+          <a:p>
+            <a:r>
+              <a:rPr lang="en-US" altLang="zh-CN" sz="14000" dirty="0"/>
+              <a:t>61681321324</a:t>
+            </a:r>
+            <a:endParaRPr lang="zh-CN" altLang="en-US" sz="14000" dirty="0"/>
+          </a:p>
+        </p:txBody>
+      </p:sp>
+    </p:spTree>
+    <p:extLst>
+      <p:ext uri="{BB962C8B-B14F-4D97-AF65-F5344CB8AC3E}">
+        <p14:creationId xmlns:p14="http://schemas.microsoft.com/office/powerpoint/2010/main" val="173812570"/>
+      </p:ext>
+    </p:extLst>
+  </p:cSld>
+  <p:clrMapOvr>
+    <a:masterClrMapping/>
+  </p:clrMapOvr>
+</p:sld>
+</file>
+
+<file path=ppt/tags/tag1.xml><?xml version="1.0" encoding="utf-8"?>
+<p:tagLst xmlns:a="http://schemas.openxmlformats.org/drawingml/2006/main" xmlns:r="http://schemas.openxmlformats.org/officeDocument/2006/relationships" xmlns:p="http://schemas.openxmlformats.org/presentationml/2006/main">
+  <p:tag name="COMMONDATA" val="eyJoZGlkIjoiYTk5YzAzNDQyYjI1MzJhMTAzMzMxMjFmYTVjMzE1NWIifQ=="/>
+</p:tagLst>
 </file>
 
 <file path=ppt/theme/theme1.xml><?xml version="1.0" encoding="utf-8"?>
@@ -3413,7 +3264,7 @@
     </a:clrScheme>
     <a:fontScheme name="Office">
       <a:majorFont>
-        <a:latin typeface="等线 Light" panose="020F0302020204030204"/>
+        <a:latin typeface="等线 Light"/>
         <a:ea typeface=""/>
         <a:cs typeface=""/>
         <a:font script="Jpan" typeface="游ゴシック Light"/>
@@ -3446,26 +3297,9 @@
         <a:font script="Viet" typeface="Times New Roman"/>
         <a:font script="Uigh" typeface="Microsoft Uighur"/>
         <a:font script="Geor" typeface="Sylfaen"/>
-        <a:font script="Armn" typeface="Arial"/>
-        <a:font script="Bugi" typeface="Leelawadee UI"/>
-        <a:font script="Bopo" typeface="Microsoft JhengHei"/>
-        <a:font script="Java" typeface="Javanese Text"/>
-        <a:font script="Lisu" typeface="Segoe UI"/>
-        <a:font script="Mymr" typeface="Myanmar Text"/>
-        <a:font script="Nkoo" typeface="Ebrima"/>
-        <a:font script="Olck" typeface="Nirmala UI"/>
-        <a:font script="Osma" typeface="Ebrima"/>
-        <a:font script="Phag" typeface="Phagspa"/>
-        <a:font script="Syrn" typeface="Estrangelo Edessa"/>
-        <a:font script="Syrj" typeface="Estrangelo Edessa"/>
-        <a:font script="Syre" typeface="Estrangelo Edessa"/>
-        <a:font script="Sora" typeface="Nirmala UI"/>
-        <a:font script="Tale" typeface="Microsoft Tai Le"/>
-        <a:font script="Talu" typeface="Microsoft New Tai Lue"/>
-        <a:font script="Tfng" typeface="Ebrima"/>
       </a:majorFont>
       <a:minorFont>
-        <a:latin typeface="等线" panose="020F0502020204030204"/>
+        <a:latin typeface="等线"/>
         <a:ea typeface=""/>
         <a:cs typeface=""/>
         <a:font script="Jpan" typeface="游ゴシック"/>
@@ -3498,23 +3332,6 @@
         <a:font script="Viet" typeface="Arial"/>
         <a:font script="Uigh" typeface="Microsoft Uighur"/>
         <a:font script="Geor" typeface="Sylfaen"/>
-        <a:font script="Armn" typeface="Arial"/>
-        <a:font script="Bugi" typeface="Leelawadee UI"/>
-        <a:font script="Bopo" typeface="Microsoft JhengHei"/>
-        <a:font script="Java" typeface="Javanese Text"/>
-        <a:font script="Lisu" typeface="Segoe UI"/>
-        <a:font script="Mymr" typeface="Myanmar Text"/>
-        <a:font script="Nkoo" typeface="Ebrima"/>
-        <a:font script="Olck" typeface="Nirmala UI"/>
-        <a:font script="Osma" typeface="Ebrima"/>
-        <a:font script="Phag" typeface="Phagspa"/>
-        <a:font script="Syrn" typeface="Estrangelo Edessa"/>
-        <a:font script="Syrj" typeface="Estrangelo Edessa"/>
-        <a:font script="Syre" typeface="Estrangelo Edessa"/>
-        <a:font script="Sora" typeface="Nirmala UI"/>
-        <a:font script="Tale" typeface="Microsoft Tai Le"/>
-        <a:font script="Talu" typeface="Microsoft New Tai Lue"/>
-        <a:font script="Tfng" typeface="Ebrima"/>
       </a:minorFont>
     </a:fontScheme>
     <a:fmtScheme name="Office">

</xml_diff>